<commit_message>
added final figures, updated the raw data for sharing
</commit_message>
<xml_diff>
--- a/DataRe-Analysis/Figures/Figure3_06-18-15_NV_v1.pptx
+++ b/DataRe-Analysis/Figures/Figure3_06-18-15_NV_v1.pptx
@@ -302,11 +302,11 @@
           <c:showBubbleSize val="0"/>
         </c:dLbls>
         <c:gapWidth val="150"/>
-        <c:axId val="-2120469368"/>
-        <c:axId val="-2031413384"/>
+        <c:axId val="2079977304"/>
+        <c:axId val="-2053550184"/>
       </c:barChart>
       <c:catAx>
-        <c:axId val="-2120469368"/>
+        <c:axId val="2079977304"/>
         <c:scaling>
           <c:orientation val="minMax"/>
         </c:scaling>
@@ -329,7 +329,7 @@
             <a:endParaRPr lang="en-US"/>
           </a:p>
         </c:txPr>
-        <c:crossAx val="-2031413384"/>
+        <c:crossAx val="-2053550184"/>
         <c:crosses val="autoZero"/>
         <c:auto val="1"/>
         <c:lblAlgn val="ctr"/>
@@ -337,7 +337,7 @@
         <c:noMultiLvlLbl val="0"/>
       </c:catAx>
       <c:valAx>
-        <c:axId val="-2031413384"/>
+        <c:axId val="-2053550184"/>
         <c:scaling>
           <c:orientation val="minMax"/>
           <c:max val="1.0"/>
@@ -361,7 +361,7 @@
             <a:endParaRPr lang="en-US"/>
           </a:p>
         </c:txPr>
-        <c:crossAx val="-2120469368"/>
+        <c:crossAx val="2079977304"/>
         <c:crosses val="autoZero"/>
         <c:crossBetween val="between"/>
         <c:majorUnit val="0.2"/>
@@ -581,7 +581,7 @@
           <a:p>
             <a:fld id="{B0C43C45-5059-1B40-B14A-2F4D282E5D75}" type="datetimeFigureOut">
               <a:rPr lang="en-US" smtClean="0"/>
-              <a:t>6/18/15</a:t>
+              <a:t>6/25/15</a:t>
             </a:fld>
             <a:endParaRPr lang="en-US"/>
           </a:p>
@@ -751,7 +751,7 @@
           <a:p>
             <a:fld id="{B0C43C45-5059-1B40-B14A-2F4D282E5D75}" type="datetimeFigureOut">
               <a:rPr lang="en-US" smtClean="0"/>
-              <a:t>6/18/15</a:t>
+              <a:t>6/25/15</a:t>
             </a:fld>
             <a:endParaRPr lang="en-US"/>
           </a:p>
@@ -931,7 +931,7 @@
           <a:p>
             <a:fld id="{B0C43C45-5059-1B40-B14A-2F4D282E5D75}" type="datetimeFigureOut">
               <a:rPr lang="en-US" smtClean="0"/>
-              <a:t>6/18/15</a:t>
+              <a:t>6/25/15</a:t>
             </a:fld>
             <a:endParaRPr lang="en-US"/>
           </a:p>
@@ -1101,7 +1101,7 @@
           <a:p>
             <a:fld id="{B0C43C45-5059-1B40-B14A-2F4D282E5D75}" type="datetimeFigureOut">
               <a:rPr lang="en-US" smtClean="0"/>
-              <a:t>6/18/15</a:t>
+              <a:t>6/25/15</a:t>
             </a:fld>
             <a:endParaRPr lang="en-US"/>
           </a:p>
@@ -1347,7 +1347,7 @@
           <a:p>
             <a:fld id="{B0C43C45-5059-1B40-B14A-2F4D282E5D75}" type="datetimeFigureOut">
               <a:rPr lang="en-US" smtClean="0"/>
-              <a:t>6/18/15</a:t>
+              <a:t>6/25/15</a:t>
             </a:fld>
             <a:endParaRPr lang="en-US"/>
           </a:p>
@@ -1635,7 +1635,7 @@
           <a:p>
             <a:fld id="{B0C43C45-5059-1B40-B14A-2F4D282E5D75}" type="datetimeFigureOut">
               <a:rPr lang="en-US" smtClean="0"/>
-              <a:t>6/18/15</a:t>
+              <a:t>6/25/15</a:t>
             </a:fld>
             <a:endParaRPr lang="en-US"/>
           </a:p>
@@ -2062,7 +2062,7 @@
           <a:p>
             <a:fld id="{B0C43C45-5059-1B40-B14A-2F4D282E5D75}" type="datetimeFigureOut">
               <a:rPr lang="en-US" smtClean="0"/>
-              <a:t>6/18/15</a:t>
+              <a:t>6/25/15</a:t>
             </a:fld>
             <a:endParaRPr lang="en-US"/>
           </a:p>
@@ -2180,7 +2180,7 @@
           <a:p>
             <a:fld id="{B0C43C45-5059-1B40-B14A-2F4D282E5D75}" type="datetimeFigureOut">
               <a:rPr lang="en-US" smtClean="0"/>
-              <a:t>6/18/15</a:t>
+              <a:t>6/25/15</a:t>
             </a:fld>
             <a:endParaRPr lang="en-US"/>
           </a:p>
@@ -2275,7 +2275,7 @@
           <a:p>
             <a:fld id="{B0C43C45-5059-1B40-B14A-2F4D282E5D75}" type="datetimeFigureOut">
               <a:rPr lang="en-US" smtClean="0"/>
-              <a:t>6/18/15</a:t>
+              <a:t>6/25/15</a:t>
             </a:fld>
             <a:endParaRPr lang="en-US"/>
           </a:p>
@@ -2552,7 +2552,7 @@
           <a:p>
             <a:fld id="{B0C43C45-5059-1B40-B14A-2F4D282E5D75}" type="datetimeFigureOut">
               <a:rPr lang="en-US" smtClean="0"/>
-              <a:t>6/18/15</a:t>
+              <a:t>6/25/15</a:t>
             </a:fld>
             <a:endParaRPr lang="en-US"/>
           </a:p>
@@ -2805,7 +2805,7 @@
           <a:p>
             <a:fld id="{B0C43C45-5059-1B40-B14A-2F4D282E5D75}" type="datetimeFigureOut">
               <a:rPr lang="en-US" smtClean="0"/>
-              <a:t>6/18/15</a:t>
+              <a:t>6/25/15</a:t>
             </a:fld>
             <a:endParaRPr lang="en-US"/>
           </a:p>
@@ -3018,7 +3018,7 @@
           <a:p>
             <a:fld id="{B0C43C45-5059-1B40-B14A-2F4D282E5D75}" type="datetimeFigureOut">
               <a:rPr lang="en-US" smtClean="0"/>
-              <a:t>6/18/15</a:t>
+              <a:t>6/25/15</a:t>
             </a:fld>
             <a:endParaRPr lang="en-US"/>
           </a:p>
@@ -3393,6 +3393,30 @@
           <a:chExt cx="0" cy="0"/>
         </a:xfrm>
       </p:grpSpPr>
+      <p:graphicFrame>
+        <p:nvGraphicFramePr>
+          <p:cNvPr id="20" name="Chart 19"/>
+          <p:cNvGraphicFramePr>
+            <a:graphicFrameLocks/>
+          </p:cNvGraphicFramePr>
+          <p:nvPr>
+            <p:extLst>
+              <p:ext uri="{D42A27DB-BD31-4B8C-83A1-F6EECF244321}">
+                <p14:modId xmlns:p14="http://schemas.microsoft.com/office/powerpoint/2010/main" val="777378319"/>
+              </p:ext>
+            </p:extLst>
+          </p:nvPr>
+        </p:nvGraphicFramePr>
+        <p:xfrm>
+          <a:off x="447257" y="549533"/>
+          <a:ext cx="4572000" cy="2743200"/>
+        </p:xfrm>
+        <a:graphic>
+          <a:graphicData uri="http://schemas.openxmlformats.org/drawingml/2006/chart">
+            <c:chart xmlns:c="http://schemas.openxmlformats.org/drawingml/2006/chart" xmlns:r="http://schemas.openxmlformats.org/officeDocument/2006/relationships" r:id="rId2"/>
+          </a:graphicData>
+        </a:graphic>
+      </p:graphicFrame>
       <p:sp>
         <p:nvSpPr>
           <p:cNvPr id="6" name="TextBox 5"/>
@@ -3776,30 +3800,6 @@
           </p:txBody>
         </p:sp>
       </p:grpSp>
-      <p:graphicFrame>
-        <p:nvGraphicFramePr>
-          <p:cNvPr id="20" name="Chart 19"/>
-          <p:cNvGraphicFramePr>
-            <a:graphicFrameLocks/>
-          </p:cNvGraphicFramePr>
-          <p:nvPr>
-            <p:extLst>
-              <p:ext uri="{D42A27DB-BD31-4B8C-83A1-F6EECF244321}">
-                <p14:modId xmlns:p14="http://schemas.microsoft.com/office/powerpoint/2010/main" val="3471281611"/>
-              </p:ext>
-            </p:extLst>
-          </p:nvPr>
-        </p:nvGraphicFramePr>
-        <p:xfrm>
-          <a:off x="447257" y="549533"/>
-          <a:ext cx="4572000" cy="2743200"/>
-        </p:xfrm>
-        <a:graphic>
-          <a:graphicData uri="http://schemas.openxmlformats.org/drawingml/2006/chart">
-            <c:chart xmlns:c="http://schemas.openxmlformats.org/drawingml/2006/chart" xmlns:r="http://schemas.openxmlformats.org/officeDocument/2006/relationships" r:id="rId2"/>
-          </a:graphicData>
-        </a:graphic>
-      </p:graphicFrame>
     </p:spTree>
     <p:extLst>
       <p:ext uri="{BB962C8B-B14F-4D97-AF65-F5344CB8AC3E}">

</xml_diff>